<commit_message>
New modifications to the Composability Selection and Client Evaluation blocks
</commit_message>
<xml_diff>
--- a/Composition_Framework_July_2023_1.pptx
+++ b/Composition_Framework_July_2023_1.pptx
@@ -17,7 +17,7 @@
     <p:sldId id="1845" r:id="rId11"/>
     <p:sldId id="1853" r:id="rId12"/>
     <p:sldId id="1850" r:id="rId13"/>
-    <p:sldId id="1851" r:id="rId14"/>
+    <p:sldId id="1854" r:id="rId14"/>
     <p:sldId id="1848" r:id="rId15"/>
     <p:sldId id="258" r:id="rId16"/>
     <p:sldId id="1846" r:id="rId17"/>
@@ -275,7 +275,7 @@
           <a:p>
             <a:fld id="{4557676F-F6A0-F649-930E-950B39BA7669}" type="datetimeFigureOut">
               <a:rPr lang="en-US" smtClean="0"/>
-              <a:t>9/20/23</a:t>
+              <a:t>9/20/2023</a:t>
             </a:fld>
             <a:endParaRPr lang="en-US"/>
           </a:p>
@@ -473,7 +473,7 @@
           <a:p>
             <a:fld id="{4557676F-F6A0-F649-930E-950B39BA7669}" type="datetimeFigureOut">
               <a:rPr lang="en-US" smtClean="0"/>
-              <a:t>9/20/23</a:t>
+              <a:t>9/20/2023</a:t>
             </a:fld>
             <a:endParaRPr lang="en-US"/>
           </a:p>
@@ -681,7 +681,7 @@
           <a:p>
             <a:fld id="{4557676F-F6A0-F649-930E-950B39BA7669}" type="datetimeFigureOut">
               <a:rPr lang="en-US" smtClean="0"/>
-              <a:t>9/20/23</a:t>
+              <a:t>9/20/2023</a:t>
             </a:fld>
             <a:endParaRPr lang="en-US"/>
           </a:p>
@@ -879,7 +879,7 @@
           <a:p>
             <a:fld id="{4557676F-F6A0-F649-930E-950B39BA7669}" type="datetimeFigureOut">
               <a:rPr lang="en-US" smtClean="0"/>
-              <a:t>9/20/23</a:t>
+              <a:t>9/20/2023</a:t>
             </a:fld>
             <a:endParaRPr lang="en-US"/>
           </a:p>
@@ -1154,7 +1154,7 @@
           <a:p>
             <a:fld id="{4557676F-F6A0-F649-930E-950B39BA7669}" type="datetimeFigureOut">
               <a:rPr lang="en-US" smtClean="0"/>
-              <a:t>9/20/23</a:t>
+              <a:t>9/20/2023</a:t>
             </a:fld>
             <a:endParaRPr lang="en-US"/>
           </a:p>
@@ -1419,7 +1419,7 @@
           <a:p>
             <a:fld id="{4557676F-F6A0-F649-930E-950B39BA7669}" type="datetimeFigureOut">
               <a:rPr lang="en-US" smtClean="0"/>
-              <a:t>9/20/23</a:t>
+              <a:t>9/20/2023</a:t>
             </a:fld>
             <a:endParaRPr lang="en-US"/>
           </a:p>
@@ -1831,7 +1831,7 @@
           <a:p>
             <a:fld id="{4557676F-F6A0-F649-930E-950B39BA7669}" type="datetimeFigureOut">
               <a:rPr lang="en-US" smtClean="0"/>
-              <a:t>9/20/23</a:t>
+              <a:t>9/20/2023</a:t>
             </a:fld>
             <a:endParaRPr lang="en-US"/>
           </a:p>
@@ -1972,7 +1972,7 @@
           <a:p>
             <a:fld id="{4557676F-F6A0-F649-930E-950B39BA7669}" type="datetimeFigureOut">
               <a:rPr lang="en-US" smtClean="0"/>
-              <a:t>9/20/23</a:t>
+              <a:t>9/20/2023</a:t>
             </a:fld>
             <a:endParaRPr lang="en-US"/>
           </a:p>
@@ -2085,7 +2085,7 @@
           <a:p>
             <a:fld id="{4557676F-F6A0-F649-930E-950B39BA7669}" type="datetimeFigureOut">
               <a:rPr lang="en-US" smtClean="0"/>
-              <a:t>9/20/23</a:t>
+              <a:t>9/20/2023</a:t>
             </a:fld>
             <a:endParaRPr lang="en-US"/>
           </a:p>
@@ -2396,7 +2396,7 @@
           <a:p>
             <a:fld id="{4557676F-F6A0-F649-930E-950B39BA7669}" type="datetimeFigureOut">
               <a:rPr lang="en-US" smtClean="0"/>
-              <a:t>9/20/23</a:t>
+              <a:t>9/20/2023</a:t>
             </a:fld>
             <a:endParaRPr lang="en-US"/>
           </a:p>
@@ -2684,7 +2684,7 @@
           <a:p>
             <a:fld id="{4557676F-F6A0-F649-930E-950B39BA7669}" type="datetimeFigureOut">
               <a:rPr lang="en-US" smtClean="0"/>
-              <a:t>9/20/23</a:t>
+              <a:t>9/20/2023</a:t>
             </a:fld>
             <a:endParaRPr lang="en-US"/>
           </a:p>
@@ -2925,7 +2925,7 @@
           <a:p>
             <a:fld id="{4557676F-F6A0-F649-930E-950B39BA7669}" type="datetimeFigureOut">
               <a:rPr lang="en-US" smtClean="0"/>
-              <a:t>9/20/23</a:t>
+              <a:t>9/20/2023</a:t>
             </a:fld>
             <a:endParaRPr lang="en-US"/>
           </a:p>
@@ -6086,7 +6086,7 @@
         </p:nvSpPr>
         <p:spPr>
           <a:xfrm>
-            <a:off x="623623" y="1974550"/>
+            <a:off x="654141" y="1484526"/>
             <a:ext cx="1212545" cy="466770"/>
           </a:xfrm>
           <a:prstGeom prst="rect">
@@ -6142,7 +6142,7 @@
         </p:nvSpPr>
         <p:spPr>
           <a:xfrm>
-            <a:off x="3033567" y="2845448"/>
+            <a:off x="3064457" y="2378678"/>
             <a:ext cx="1212545" cy="466770"/>
           </a:xfrm>
           <a:prstGeom prst="rect">
@@ -6198,7 +6198,7 @@
         </p:nvSpPr>
         <p:spPr>
           <a:xfrm>
-            <a:off x="623623" y="2845448"/>
+            <a:off x="654140" y="2378678"/>
             <a:ext cx="1212545" cy="466770"/>
           </a:xfrm>
           <a:prstGeom prst="rect">
@@ -6236,62 +6236,6 @@
                 </a:solidFill>
               </a:rPr>
               <a:t>Correlate Servers with a Reference Variable</a:t>
-            </a:r>
-          </a:p>
-        </p:txBody>
-      </p:sp>
-      <p:sp>
-        <p:nvSpPr>
-          <p:cNvPr id="72" name="Rectangle 71">
-            <a:extLst>
-              <a:ext uri="{FF2B5EF4-FFF2-40B4-BE49-F238E27FC236}">
-                <a16:creationId xmlns:a16="http://schemas.microsoft.com/office/drawing/2014/main" id="{22290178-ED1F-6903-9C4C-DD1241214D19}"/>
-              </a:ext>
-            </a:extLst>
-          </p:cNvPr>
-          <p:cNvSpPr/>
-          <p:nvPr/>
-        </p:nvSpPr>
-        <p:spPr>
-          <a:xfrm>
-            <a:off x="980348" y="5995304"/>
-            <a:ext cx="3431014" cy="466770"/>
-          </a:xfrm>
-          <a:prstGeom prst="rect">
-            <a:avLst/>
-          </a:prstGeom>
-          <a:solidFill>
-            <a:srgbClr val="FFFF00"/>
-          </a:solidFill>
-        </p:spPr>
-        <p:style>
-          <a:lnRef idx="2">
-            <a:schemeClr val="accent1">
-              <a:shade val="50000"/>
-            </a:schemeClr>
-          </a:lnRef>
-          <a:fillRef idx="1">
-            <a:schemeClr val="accent1"/>
-          </a:fillRef>
-          <a:effectRef idx="0">
-            <a:schemeClr val="accent1"/>
-          </a:effectRef>
-          <a:fontRef idx="minor">
-            <a:schemeClr val="lt1"/>
-          </a:fontRef>
-        </p:style>
-        <p:txBody>
-          <a:bodyPr rtlCol="0" anchor="ctr"/>
-          <a:lstStyle/>
-          <a:p>
-            <a:pPr algn="ctr"/>
-            <a:r>
-              <a:rPr lang="en-US" sz="1050" dirty="0">
-                <a:solidFill>
-                  <a:schemeClr val="tx1"/>
-                </a:solidFill>
-              </a:rPr>
-              <a:t>Choose Server and Resource  and Augment System</a:t>
             </a:r>
           </a:p>
         </p:txBody>
@@ -6346,7 +6290,7 @@
         </p:nvSpPr>
         <p:spPr>
           <a:xfrm>
-            <a:off x="6895071" y="1463820"/>
+            <a:off x="7081713" y="1455042"/>
             <a:ext cx="1793414" cy="466770"/>
           </a:xfrm>
           <a:prstGeom prst="rect">
@@ -6402,7 +6346,7 @@
         </p:nvSpPr>
         <p:spPr>
           <a:xfrm>
-            <a:off x="6895070" y="2231570"/>
+            <a:off x="7081713" y="2044203"/>
             <a:ext cx="1792045" cy="466770"/>
           </a:xfrm>
           <a:prstGeom prst="rect">
@@ -6458,7 +6402,7 @@
         </p:nvSpPr>
         <p:spPr>
           <a:xfrm>
-            <a:off x="3024173" y="3668381"/>
+            <a:off x="3064457" y="3272830"/>
             <a:ext cx="1212545" cy="466770"/>
           </a:xfrm>
           <a:prstGeom prst="rect">
@@ -6514,7 +6458,7 @@
         </p:nvSpPr>
         <p:spPr>
           <a:xfrm>
-            <a:off x="3033567" y="1974454"/>
+            <a:off x="3032338" y="1484526"/>
             <a:ext cx="1212545" cy="466770"/>
           </a:xfrm>
           <a:prstGeom prst="rect">
@@ -6570,7 +6514,7 @@
         </p:nvSpPr>
         <p:spPr>
           <a:xfrm>
-            <a:off x="155146" y="1458001"/>
+            <a:off x="157826" y="1353919"/>
             <a:ext cx="2205172" cy="3798531"/>
           </a:xfrm>
           <a:prstGeom prst="rect">
@@ -6645,7 +6589,7 @@
                   <a:schemeClr val="tx1"/>
                 </a:solidFill>
               </a:rPr>
-              <a:t>Choose Best Server option</a:t>
+              <a:t>For Best Server option</a:t>
             </a:r>
           </a:p>
         </p:txBody>
@@ -6664,7 +6608,7 @@
         </p:nvSpPr>
         <p:spPr>
           <a:xfrm>
-            <a:off x="2454838" y="1458001"/>
+            <a:off x="2526448" y="1353920"/>
             <a:ext cx="2205172" cy="3798531"/>
           </a:xfrm>
           <a:prstGeom prst="rect">
@@ -6739,7 +6683,7 @@
                   <a:schemeClr val="tx1"/>
                 </a:solidFill>
               </a:rPr>
-              <a:t>Choose best Connection option</a:t>
+              <a:t>For best Connection option</a:t>
             </a:r>
           </a:p>
         </p:txBody>
@@ -6758,7 +6702,7 @@
         </p:nvSpPr>
         <p:spPr>
           <a:xfrm>
-            <a:off x="613946" y="3655920"/>
+            <a:off x="642059" y="3272830"/>
             <a:ext cx="1212545" cy="466770"/>
           </a:xfrm>
           <a:prstGeom prst="rect">
@@ -6814,7 +6758,7 @@
         </p:nvSpPr>
         <p:spPr>
           <a:xfrm>
-            <a:off x="6895069" y="2962230"/>
+            <a:off x="7066160" y="2612407"/>
             <a:ext cx="1792045" cy="466770"/>
           </a:xfrm>
           <a:prstGeom prst="rect">
@@ -6851,7 +6795,7 @@
                   <a:schemeClr val="tx1"/>
                 </a:solidFill>
               </a:rPr>
-              <a:t>Grab Client Request Numerical Range of Data</a:t>
+              <a:t>Grab Client Resource  Request Numerical Range of Data</a:t>
             </a:r>
           </a:p>
         </p:txBody>
@@ -6870,7 +6814,7 @@
         </p:nvSpPr>
         <p:spPr>
           <a:xfrm>
-            <a:off x="6884846" y="3692891"/>
+            <a:off x="7069889" y="3190912"/>
             <a:ext cx="1792045" cy="466770"/>
           </a:xfrm>
           <a:prstGeom prst="rect">
@@ -6907,7 +6851,7 @@
                   <a:schemeClr val="tx1"/>
                 </a:solidFill>
               </a:rPr>
-              <a:t>Grab Client Request Similar Items in Transaction Data</a:t>
+              <a:t>Grab Client Request Similar Resource Items in Transaction Data</a:t>
             </a:r>
           </a:p>
         </p:txBody>
@@ -6926,7 +6870,7 @@
         </p:nvSpPr>
         <p:spPr>
           <a:xfrm>
-            <a:off x="6886904" y="4460640"/>
+            <a:off x="7071730" y="3785295"/>
             <a:ext cx="1792045" cy="466770"/>
           </a:xfrm>
           <a:prstGeom prst="rect">
@@ -6963,7 +6907,7 @@
                   <a:schemeClr val="tx1"/>
                 </a:solidFill>
               </a:rPr>
-              <a:t>Grab Client Request Transaction Trends</a:t>
+              <a:t>Grab Client Resource  Request Transaction Trends</a:t>
             </a:r>
           </a:p>
         </p:txBody>
@@ -6982,7 +6926,7 @@
         </p:nvSpPr>
         <p:spPr>
           <a:xfrm>
-            <a:off x="6895069" y="5228389"/>
+            <a:off x="7095533" y="4363800"/>
             <a:ext cx="1792045" cy="466770"/>
           </a:xfrm>
           <a:prstGeom prst="rect">
@@ -7019,7 +6963,7 @@
                   <a:schemeClr val="tx1"/>
                 </a:solidFill>
               </a:rPr>
-              <a:t>Create a Decision Tree</a:t>
+              <a:t>Create a Decision Tree for Resource Selection</a:t>
             </a:r>
           </a:p>
         </p:txBody>
@@ -7038,8 +6982,8 @@
         </p:nvSpPr>
         <p:spPr>
           <a:xfrm>
-            <a:off x="6895069" y="5996138"/>
-            <a:ext cx="1792045" cy="466770"/>
+            <a:off x="7101941" y="4942305"/>
+            <a:ext cx="1792045" cy="622869"/>
           </a:xfrm>
           <a:prstGeom prst="rect">
             <a:avLst/>
@@ -7075,7 +7019,7 @@
                   <a:schemeClr val="tx1"/>
                 </a:solidFill>
               </a:rPr>
-              <a:t>What Resources are missing from Server to Meet Client Request?</a:t>
+              <a:t> Resources are missing from Server to Meet Client Request?</a:t>
             </a:r>
           </a:p>
         </p:txBody>
@@ -7094,7 +7038,7 @@
         </p:nvSpPr>
         <p:spPr>
           <a:xfrm>
-            <a:off x="4941096" y="2861045"/>
+            <a:off x="5190902" y="2378678"/>
             <a:ext cx="1212545" cy="466770"/>
           </a:xfrm>
           <a:prstGeom prst="rect">
@@ -7150,7 +7094,7 @@
         </p:nvSpPr>
         <p:spPr>
           <a:xfrm>
-            <a:off x="4907354" y="3655920"/>
+            <a:off x="5172497" y="3272830"/>
             <a:ext cx="1212545" cy="466770"/>
           </a:xfrm>
           <a:prstGeom prst="rect">
@@ -7206,8 +7150,8 @@
         </p:nvSpPr>
         <p:spPr>
           <a:xfrm>
-            <a:off x="4806053" y="1453091"/>
-            <a:ext cx="1684086" cy="4379298"/>
+            <a:off x="4949907" y="1353918"/>
+            <a:ext cx="1687380" cy="4332463"/>
           </a:xfrm>
           <a:prstGeom prst="rect">
             <a:avLst/>
@@ -7293,7 +7237,7 @@
                   <a:schemeClr val="tx1"/>
                 </a:solidFill>
               </a:rPr>
-              <a:t>Choose best Resource option</a:t>
+              <a:t>For best Resource option</a:t>
             </a:r>
           </a:p>
         </p:txBody>
@@ -7312,7 +7256,7 @@
         </p:nvSpPr>
         <p:spPr>
           <a:xfrm>
-            <a:off x="4941097" y="1970915"/>
+            <a:off x="5163953" y="1484526"/>
             <a:ext cx="1212545" cy="466770"/>
           </a:xfrm>
           <a:prstGeom prst="rect">
@@ -7381,7 +7325,7 @@
         </p:nvSpPr>
         <p:spPr>
           <a:xfrm>
-            <a:off x="4888603" y="4377373"/>
+            <a:off x="5190902" y="4166982"/>
             <a:ext cx="1212545" cy="466770"/>
           </a:xfrm>
           <a:prstGeom prst="rect">
@@ -7435,6 +7379,62 @@
                 </a:solidFill>
               </a:rPr>
               <a:t> Resource Characteristics</a:t>
+            </a:r>
+          </a:p>
+        </p:txBody>
+      </p:sp>
+      <p:sp>
+        <p:nvSpPr>
+          <p:cNvPr id="7" name="Rectangle 6">
+            <a:extLst>
+              <a:ext uri="{FF2B5EF4-FFF2-40B4-BE49-F238E27FC236}">
+                <a16:creationId xmlns:a16="http://schemas.microsoft.com/office/drawing/2014/main" id="{B5742E2F-7743-CC30-86C2-2DE70B2425F7}"/>
+              </a:ext>
+            </a:extLst>
+          </p:cNvPr>
+          <p:cNvSpPr/>
+          <p:nvPr/>
+        </p:nvSpPr>
+        <p:spPr>
+          <a:xfrm>
+            <a:off x="7101941" y="5696303"/>
+            <a:ext cx="1798453" cy="622869"/>
+          </a:xfrm>
+          <a:prstGeom prst="rect">
+            <a:avLst/>
+          </a:prstGeom>
+          <a:solidFill>
+            <a:srgbClr val="FFFF00"/>
+          </a:solidFill>
+        </p:spPr>
+        <p:style>
+          <a:lnRef idx="2">
+            <a:schemeClr val="accent1">
+              <a:shade val="50000"/>
+            </a:schemeClr>
+          </a:lnRef>
+          <a:fillRef idx="1">
+            <a:schemeClr val="accent1"/>
+          </a:fillRef>
+          <a:effectRef idx="0">
+            <a:schemeClr val="accent1"/>
+          </a:effectRef>
+          <a:fontRef idx="minor">
+            <a:schemeClr val="lt1"/>
+          </a:fontRef>
+        </p:style>
+        <p:txBody>
+          <a:bodyPr rtlCol="0" anchor="ctr"/>
+          <a:lstStyle/>
+          <a:p>
+            <a:pPr algn="ctr"/>
+            <a:r>
+              <a:rPr lang="en-US" sz="1050" dirty="0">
+                <a:solidFill>
+                  <a:schemeClr val="tx1"/>
+                </a:solidFill>
+              </a:rPr>
+              <a:t>Subspace FINDIT clustering of Resources</a:t>
             </a:r>
           </a:p>
         </p:txBody>
@@ -8106,7 +8106,7 @@
             <a:avLst/>
           </a:prstGeom>
           <a:solidFill>
-            <a:srgbClr val="00B0F0"/>
+            <a:srgbClr val="FFC000"/>
           </a:solidFill>
         </p:spPr>
         <p:style>
@@ -8136,7 +8136,7 @@
                   <a:schemeClr val="tx1"/>
                 </a:solidFill>
               </a:rPr>
-              <a:t>Client dataset input</a:t>
+              <a:t>Client Request </a:t>
             </a:r>
           </a:p>
         </p:txBody>
@@ -8400,8 +8400,8 @@
         </p:nvSpPr>
         <p:spPr>
           <a:xfrm rot="16200000">
-            <a:off x="-593590" y="4332456"/>
-            <a:ext cx="2842544" cy="221239"/>
+            <a:off x="-465640" y="4219146"/>
+            <a:ext cx="2601284" cy="206604"/>
           </a:xfrm>
           <a:prstGeom prst="rect">
             <a:avLst/>
@@ -8439,7 +8439,7 @@
             <a:r>
               <a:rPr lang="en-US" sz="1100" b="1" strike="noStrike" spc="-1" dirty="0">
                 <a:solidFill>
-                  <a:srgbClr val="FFFFFF"/>
+                  <a:schemeClr val="tx1"/>
                 </a:solidFill>
                 <a:latin typeface="Arial" panose="020B0604020202020204" pitchFamily="34" charset="0"/>
                 <a:cs typeface="Arial" panose="020B0604020202020204" pitchFamily="34" charset="0"/>
@@ -8447,6 +8447,9 @@
               <a:t>RESTful API (RF/SF)</a:t>
             </a:r>
             <a:endParaRPr lang="en-IE" sz="1100" b="1" strike="noStrike" spc="-1" dirty="0">
+              <a:solidFill>
+                <a:schemeClr val="tx1"/>
+              </a:solidFill>
               <a:latin typeface="Arial" panose="020B0604020202020204" pitchFamily="34" charset="0"/>
               <a:cs typeface="Arial" panose="020B0604020202020204" pitchFamily="34" charset="0"/>
             </a:endParaRPr>
@@ -8458,6 +8461,9 @@
               </a:lnSpc>
             </a:pPr>
             <a:endParaRPr lang="en-IE" sz="1100" b="1" strike="noStrike" spc="-1" dirty="0">
+              <a:solidFill>
+                <a:schemeClr val="tx1"/>
+              </a:solidFill>
               <a:latin typeface="Arial" panose="020B0604020202020204" pitchFamily="34" charset="0"/>
               <a:cs typeface="Arial" panose="020B0604020202020204" pitchFamily="34" charset="0"/>
             </a:endParaRPr>
@@ -8478,8 +8484,8 @@
         </p:nvSpPr>
         <p:spPr>
           <a:xfrm rot="16200000">
-            <a:off x="-1643961" y="4680041"/>
-            <a:ext cx="3719716" cy="357793"/>
+            <a:off x="-1096106" y="4132188"/>
+            <a:ext cx="2624010" cy="357793"/>
           </a:xfrm>
           <a:prstGeom prst="rect">
             <a:avLst/>
@@ -8510,7 +8516,11 @@
           <a:p>
             <a:pPr algn="ctr"/>
             <a:r>
-              <a:rPr lang="en-US" dirty="0"/>
+              <a:rPr lang="en-US" dirty="0">
+                <a:solidFill>
+                  <a:schemeClr val="tx1"/>
+                </a:solidFill>
+              </a:rPr>
               <a:t>Message Queue</a:t>
             </a:r>
           </a:p>
@@ -8532,9 +8542,9 @@
           <p:nvPr/>
         </p:nvCxnSpPr>
         <p:spPr>
-          <a:xfrm>
-            <a:off x="444425" y="4443076"/>
-            <a:ext cx="272638" cy="0"/>
+          <a:xfrm flipV="1">
+            <a:off x="444427" y="4322448"/>
+            <a:ext cx="287273" cy="120630"/>
           </a:xfrm>
           <a:prstGeom prst="line">
             <a:avLst/>
@@ -8606,24 +8616,23 @@
       </p:cxnSp>
       <p:cxnSp>
         <p:nvCxnSpPr>
-          <p:cNvPr id="35" name="Straight Connector 34">
-            <a:extLst>
-              <a:ext uri="{FF2B5EF4-FFF2-40B4-BE49-F238E27FC236}">
-                <a16:creationId xmlns:a16="http://schemas.microsoft.com/office/drawing/2014/main" id="{DF0592DB-409A-6900-F6F3-E70AD5990D2B}"/>
+          <p:cNvPr id="38" name="Straight Connector 37">
+            <a:extLst>
+              <a:ext uri="{FF2B5EF4-FFF2-40B4-BE49-F238E27FC236}">
+                <a16:creationId xmlns:a16="http://schemas.microsoft.com/office/drawing/2014/main" id="{47ABC277-B9A2-B7B2-5CB1-2F141144826A}"/>
               </a:ext>
             </a:extLst>
           </p:cNvPr>
           <p:cNvCxnSpPr>
             <a:cxnSpLocks/>
             <a:stCxn id="20" idx="2"/>
-            <a:endCxn id="6" idx="1"/>
           </p:cNvCxnSpPr>
           <p:nvPr/>
         </p:nvCxnSpPr>
         <p:spPr>
           <a:xfrm>
-            <a:off x="938302" y="4443076"/>
-            <a:ext cx="270807" cy="2064421"/>
+            <a:off x="938304" y="4322448"/>
+            <a:ext cx="300636" cy="1712930"/>
           </a:xfrm>
           <a:prstGeom prst="line">
             <a:avLst/>
@@ -8649,50 +8658,6 @@
           </a:fontRef>
         </p:style>
       </p:cxnSp>
-      <p:cxnSp>
-        <p:nvCxnSpPr>
-          <p:cNvPr id="38" name="Straight Connector 37">
-            <a:extLst>
-              <a:ext uri="{FF2B5EF4-FFF2-40B4-BE49-F238E27FC236}">
-                <a16:creationId xmlns:a16="http://schemas.microsoft.com/office/drawing/2014/main" id="{47ABC277-B9A2-B7B2-5CB1-2F141144826A}"/>
-              </a:ext>
-            </a:extLst>
-          </p:cNvPr>
-          <p:cNvCxnSpPr>
-            <a:cxnSpLocks/>
-            <a:stCxn id="20" idx="2"/>
-          </p:cNvCxnSpPr>
-          <p:nvPr/>
-        </p:nvCxnSpPr>
-        <p:spPr>
-          <a:xfrm>
-            <a:off x="938302" y="4443076"/>
-            <a:ext cx="300636" cy="1592300"/>
-          </a:xfrm>
-          <a:prstGeom prst="line">
-            <a:avLst/>
-          </a:prstGeom>
-          <a:ln w="57150">
-            <a:solidFill>
-              <a:srgbClr val="0070C0"/>
-            </a:solidFill>
-          </a:ln>
-        </p:spPr>
-        <p:style>
-          <a:lnRef idx="2">
-            <a:schemeClr val="accent1"/>
-          </a:lnRef>
-          <a:fillRef idx="0">
-            <a:schemeClr val="accent1"/>
-          </a:fillRef>
-          <a:effectRef idx="1">
-            <a:schemeClr val="accent1"/>
-          </a:effectRef>
-          <a:fontRef idx="minor">
-            <a:schemeClr val="tx1"/>
-          </a:fontRef>
-        </p:style>
-      </p:cxnSp>
       <p:sp>
         <p:nvSpPr>
           <p:cNvPr id="41" name="CustomShape 30">
@@ -8746,7 +8711,7 @@
             <a:r>
               <a:rPr lang="en-US" sz="1100" b="1" strike="noStrike" spc="-1" dirty="0">
                 <a:solidFill>
-                  <a:srgbClr val="FFFFFF"/>
+                  <a:schemeClr val="tx1"/>
                 </a:solidFill>
                 <a:latin typeface="Arial" panose="020B0604020202020204" pitchFamily="34" charset="0"/>
                 <a:cs typeface="Arial" panose="020B0604020202020204" pitchFamily="34" charset="0"/>
@@ -8754,6 +8719,9 @@
               <a:t>RESTful API (RF/SF)</a:t>
             </a:r>
             <a:endParaRPr lang="en-IE" sz="1100" b="1" strike="noStrike" spc="-1" dirty="0">
+              <a:solidFill>
+                <a:schemeClr val="tx1"/>
+              </a:solidFill>
               <a:latin typeface="Arial" panose="020B0604020202020204" pitchFamily="34" charset="0"/>
               <a:cs typeface="Arial" panose="020B0604020202020204" pitchFamily="34" charset="0"/>
             </a:endParaRPr>
@@ -8765,6 +8733,9 @@
               </a:lnSpc>
             </a:pPr>
             <a:endParaRPr lang="en-IE" sz="1100" b="1" strike="noStrike" spc="-1" dirty="0">
+              <a:solidFill>
+                <a:schemeClr val="tx1"/>
+              </a:solidFill>
               <a:latin typeface="Arial" panose="020B0604020202020204" pitchFamily="34" charset="0"/>
               <a:cs typeface="Arial" panose="020B0604020202020204" pitchFamily="34" charset="0"/>
             </a:endParaRPr>
@@ -8817,7 +8788,11 @@
           <a:p>
             <a:pPr algn="ctr"/>
             <a:r>
-              <a:rPr lang="en-US" dirty="0"/>
+              <a:rPr lang="en-US" dirty="0">
+                <a:solidFill>
+                  <a:schemeClr val="tx1"/>
+                </a:solidFill>
+              </a:rPr>
               <a:t>Message Queue</a:t>
             </a:r>
           </a:p>
@@ -8964,7 +8939,7 @@
             <a:r>
               <a:rPr lang="en-US" sz="1100" b="1" strike="noStrike" spc="-1" dirty="0">
                 <a:solidFill>
-                  <a:srgbClr val="FFFFFF"/>
+                  <a:schemeClr val="tx1"/>
                 </a:solidFill>
                 <a:latin typeface="Arial" panose="020B0604020202020204" pitchFamily="34" charset="0"/>
                 <a:cs typeface="Arial" panose="020B0604020202020204" pitchFamily="34" charset="0"/>
@@ -8972,6 +8947,9 @@
               <a:t>RESTful API (RF/SF)</a:t>
             </a:r>
             <a:endParaRPr lang="en-IE" sz="1100" b="1" strike="noStrike" spc="-1" dirty="0">
+              <a:solidFill>
+                <a:schemeClr val="tx1"/>
+              </a:solidFill>
               <a:latin typeface="Arial" panose="020B0604020202020204" pitchFamily="34" charset="0"/>
               <a:cs typeface="Arial" panose="020B0604020202020204" pitchFamily="34" charset="0"/>
             </a:endParaRPr>
@@ -8983,6 +8961,9 @@
               </a:lnSpc>
             </a:pPr>
             <a:endParaRPr lang="en-IE" sz="1100" b="1" strike="noStrike" spc="-1" dirty="0">
+              <a:solidFill>
+                <a:schemeClr val="tx1"/>
+              </a:solidFill>
               <a:latin typeface="Arial" panose="020B0604020202020204" pitchFamily="34" charset="0"/>
               <a:cs typeface="Arial" panose="020B0604020202020204" pitchFamily="34" charset="0"/>
             </a:endParaRPr>
@@ -9035,7 +9016,11 @@
           <a:p>
             <a:pPr algn="ctr"/>
             <a:r>
-              <a:rPr lang="en-US" dirty="0"/>
+              <a:rPr lang="en-US" dirty="0">
+                <a:solidFill>
+                  <a:schemeClr val="tx1"/>
+                </a:solidFill>
+              </a:rPr>
               <a:t>Message Queue</a:t>
             </a:r>
           </a:p>
@@ -9234,6 +9219,135 @@
           </a:p>
         </p:txBody>
       </p:sp>
+      <p:sp>
+        <p:nvSpPr>
+          <p:cNvPr id="28" name="CustomShape 30">
+            <a:extLst>
+              <a:ext uri="{FF2B5EF4-FFF2-40B4-BE49-F238E27FC236}">
+                <a16:creationId xmlns:a16="http://schemas.microsoft.com/office/drawing/2014/main" id="{89CEEF0B-2C59-1DBC-974A-DC439D8CCB9E}"/>
+              </a:ext>
+            </a:extLst>
+          </p:cNvPr>
+          <p:cNvSpPr/>
+          <p:nvPr/>
+        </p:nvSpPr>
+        <p:spPr>
+          <a:xfrm rot="16200000">
+            <a:off x="-180247" y="5946973"/>
+            <a:ext cx="1147989" cy="675901"/>
+          </a:xfrm>
+          <a:prstGeom prst="rect">
+            <a:avLst/>
+          </a:prstGeom>
+          <a:solidFill>
+            <a:srgbClr val="FFC000"/>
+          </a:solidFill>
+          <a:ln/>
+        </p:spPr>
+        <p:style>
+          <a:lnRef idx="2">
+            <a:schemeClr val="accent2"/>
+          </a:lnRef>
+          <a:fillRef idx="1">
+            <a:schemeClr val="lt1"/>
+          </a:fillRef>
+          <a:effectRef idx="0">
+            <a:schemeClr val="accent2"/>
+          </a:effectRef>
+          <a:fontRef idx="minor">
+            <a:schemeClr val="dk1"/>
+          </a:fontRef>
+        </p:style>
+        <p:txBody>
+          <a:bodyPr lIns="90000" tIns="45000" rIns="90000" bIns="45000">
+            <a:noAutofit/>
+          </a:bodyPr>
+          <a:lstStyle/>
+          <a:p>
+            <a:pPr algn="ctr"/>
+            <a:r>
+              <a:rPr lang="en-US" sz="1100" dirty="0">
+                <a:solidFill>
+                  <a:schemeClr val="tx1"/>
+                </a:solidFill>
+              </a:rPr>
+              <a:t>Evaluate and Meet Client Requirements</a:t>
+            </a:r>
+          </a:p>
+          <a:p>
+            <a:pPr algn="ctr">
+              <a:lnSpc>
+                <a:spcPct val="100000"/>
+              </a:lnSpc>
+            </a:pPr>
+            <a:endParaRPr lang="en-IE" sz="1100" b="1" strike="noStrike" spc="-1" dirty="0">
+              <a:solidFill>
+                <a:schemeClr val="tx1"/>
+              </a:solidFill>
+              <a:latin typeface="Arial" panose="020B0604020202020204" pitchFamily="34" charset="0"/>
+              <a:cs typeface="Arial" panose="020B0604020202020204" pitchFamily="34" charset="0"/>
+            </a:endParaRPr>
+          </a:p>
+          <a:p>
+            <a:pPr algn="ctr">
+              <a:lnSpc>
+                <a:spcPct val="100000"/>
+              </a:lnSpc>
+            </a:pPr>
+            <a:endParaRPr lang="en-IE" sz="1100" b="1" strike="noStrike" spc="-1" dirty="0">
+              <a:solidFill>
+                <a:schemeClr val="tx1"/>
+              </a:solidFill>
+              <a:latin typeface="Arial" panose="020B0604020202020204" pitchFamily="34" charset="0"/>
+              <a:cs typeface="Arial" panose="020B0604020202020204" pitchFamily="34" charset="0"/>
+            </a:endParaRPr>
+          </a:p>
+        </p:txBody>
+      </p:sp>
+      <p:cxnSp>
+        <p:nvCxnSpPr>
+          <p:cNvPr id="29" name="Straight Connector 28">
+            <a:extLst>
+              <a:ext uri="{FF2B5EF4-FFF2-40B4-BE49-F238E27FC236}">
+                <a16:creationId xmlns:a16="http://schemas.microsoft.com/office/drawing/2014/main" id="{AE28C8FD-9DF9-3267-EE75-532DE5E07306}"/>
+              </a:ext>
+            </a:extLst>
+          </p:cNvPr>
+          <p:cNvCxnSpPr>
+            <a:cxnSpLocks/>
+            <a:stCxn id="28" idx="2"/>
+          </p:cNvCxnSpPr>
+          <p:nvPr/>
+        </p:nvCxnSpPr>
+        <p:spPr>
+          <a:xfrm>
+            <a:off x="731698" y="6284923"/>
+            <a:ext cx="490343" cy="289449"/>
+          </a:xfrm>
+          <a:prstGeom prst="line">
+            <a:avLst/>
+          </a:prstGeom>
+          <a:ln w="57150">
+            <a:solidFill>
+              <a:srgbClr val="00B050"/>
+            </a:solidFill>
+          </a:ln>
+        </p:spPr>
+        <p:style>
+          <a:lnRef idx="2">
+            <a:schemeClr val="accent1"/>
+          </a:lnRef>
+          <a:fillRef idx="0">
+            <a:schemeClr val="accent1"/>
+          </a:fillRef>
+          <a:effectRef idx="1">
+            <a:schemeClr val="accent1"/>
+          </a:effectRef>
+          <a:fontRef idx="minor">
+            <a:schemeClr val="tx1"/>
+          </a:fontRef>
+        </p:style>
+      </p:cxnSp>
     </p:spTree>
     <p:extLst>
       <p:ext uri="{BB962C8B-B14F-4D97-AF65-F5344CB8AC3E}">
@@ -9351,7 +9465,7 @@
                                           </p:stCondLst>
                                         </p:cTn>
                                         <p:tgtEl>
-                                          <p:spTgt spid="35"/>
+                                          <p:spTgt spid="38"/>
                                         </p:tgtEl>
                                         <p:attrNameLst>
                                           <p:attrName>style.visibility</p:attrName>
@@ -9365,7 +9479,7 @@
                                       <p:cBhvr>
                                         <p:cTn id="13" dur="500"/>
                                         <p:tgtEl>
-                                          <p:spTgt spid="35"/>
+                                          <p:spTgt spid="38"/>
                                         </p:tgtEl>
                                       </p:cBhvr>
                                     </p:animEffect>
@@ -9386,7 +9500,7 @@
                                           </p:stCondLst>
                                         </p:cTn>
                                         <p:tgtEl>
-                                          <p:spTgt spid="38"/>
+                                          <p:spTgt spid="43"/>
                                         </p:tgtEl>
                                         <p:attrNameLst>
                                           <p:attrName>style.visibility</p:attrName>
@@ -9400,7 +9514,7 @@
                                       <p:cBhvr>
                                         <p:cTn id="16" dur="500"/>
                                         <p:tgtEl>
-                                          <p:spTgt spid="38"/>
+                                          <p:spTgt spid="43"/>
                                         </p:tgtEl>
                                       </p:cBhvr>
                                     </p:animEffect>
@@ -9421,7 +9535,7 @@
                                           </p:stCondLst>
                                         </p:cTn>
                                         <p:tgtEl>
-                                          <p:spTgt spid="43"/>
+                                          <p:spTgt spid="51"/>
                                         </p:tgtEl>
                                         <p:attrNameLst>
                                           <p:attrName>style.visibility</p:attrName>
@@ -9435,7 +9549,7 @@
                                       <p:cBhvr>
                                         <p:cTn id="19" dur="500"/>
                                         <p:tgtEl>
-                                          <p:spTgt spid="43"/>
+                                          <p:spTgt spid="51"/>
                                         </p:tgtEl>
                                       </p:cBhvr>
                                     </p:animEffect>
@@ -9456,7 +9570,7 @@
                                           </p:stCondLst>
                                         </p:cTn>
                                         <p:tgtEl>
-                                          <p:spTgt spid="51"/>
+                                          <p:spTgt spid="76"/>
                                         </p:tgtEl>
                                         <p:attrNameLst>
                                           <p:attrName>style.visibility</p:attrName>
@@ -9470,7 +9584,7 @@
                                       <p:cBhvr>
                                         <p:cTn id="22" dur="500"/>
                                         <p:tgtEl>
-                                          <p:spTgt spid="51"/>
+                                          <p:spTgt spid="76"/>
                                         </p:tgtEl>
                                       </p:cBhvr>
                                     </p:animEffect>
@@ -9491,7 +9605,7 @@
                                           </p:stCondLst>
                                         </p:cTn>
                                         <p:tgtEl>
-                                          <p:spTgt spid="76"/>
+                                          <p:spTgt spid="85"/>
                                         </p:tgtEl>
                                         <p:attrNameLst>
                                           <p:attrName>style.visibility</p:attrName>
@@ -9505,7 +9619,7 @@
                                       <p:cBhvr>
                                         <p:cTn id="25" dur="500"/>
                                         <p:tgtEl>
-                                          <p:spTgt spid="76"/>
+                                          <p:spTgt spid="85"/>
                                         </p:tgtEl>
                                       </p:cBhvr>
                                     </p:animEffect>
@@ -9526,7 +9640,7 @@
                                           </p:stCondLst>
                                         </p:cTn>
                                         <p:tgtEl>
-                                          <p:spTgt spid="85"/>
+                                          <p:spTgt spid="29"/>
                                         </p:tgtEl>
                                         <p:attrNameLst>
                                           <p:attrName>style.visibility</p:attrName>
@@ -9540,7 +9654,7 @@
                                       <p:cBhvr>
                                         <p:cTn id="28" dur="500"/>
                                         <p:tgtEl>
-                                          <p:spTgt spid="85"/>
+                                          <p:spTgt spid="29"/>
                                         </p:tgtEl>
                                       </p:cBhvr>
                                     </p:animEffect>
@@ -10232,7 +10346,7 @@
             <a:avLst/>
           </a:prstGeom>
           <a:solidFill>
-            <a:srgbClr val="00B0F0"/>
+            <a:srgbClr val="FFC000"/>
           </a:solidFill>
         </p:spPr>
         <p:style>
@@ -10262,7 +10376,7 @@
                   <a:schemeClr val="tx1"/>
                 </a:solidFill>
               </a:rPr>
-              <a:t>Client dataset input</a:t>
+              <a:t>Client Request </a:t>
             </a:r>
           </a:p>
         </p:txBody>
@@ -10526,8 +10640,8 @@
         </p:nvSpPr>
         <p:spPr>
           <a:xfrm rot="16200000">
-            <a:off x="-593590" y="4332456"/>
-            <a:ext cx="2842544" cy="221239"/>
+            <a:off x="-465640" y="4219146"/>
+            <a:ext cx="2601284" cy="206604"/>
           </a:xfrm>
           <a:prstGeom prst="rect">
             <a:avLst/>
@@ -10565,7 +10679,7 @@
             <a:r>
               <a:rPr lang="en-US" sz="1100" b="1" strike="noStrike" spc="-1" dirty="0">
                 <a:solidFill>
-                  <a:srgbClr val="FFFFFF"/>
+                  <a:schemeClr val="tx1"/>
                 </a:solidFill>
                 <a:latin typeface="Arial" panose="020B0604020202020204" pitchFamily="34" charset="0"/>
                 <a:cs typeface="Arial" panose="020B0604020202020204" pitchFamily="34" charset="0"/>
@@ -10573,6 +10687,9 @@
               <a:t>RESTful API (RF/SF)</a:t>
             </a:r>
             <a:endParaRPr lang="en-IE" sz="1100" b="1" strike="noStrike" spc="-1" dirty="0">
+              <a:solidFill>
+                <a:schemeClr val="tx1"/>
+              </a:solidFill>
               <a:latin typeface="Arial" panose="020B0604020202020204" pitchFamily="34" charset="0"/>
               <a:cs typeface="Arial" panose="020B0604020202020204" pitchFamily="34" charset="0"/>
             </a:endParaRPr>
@@ -10584,6 +10701,9 @@
               </a:lnSpc>
             </a:pPr>
             <a:endParaRPr lang="en-IE" sz="1100" b="1" strike="noStrike" spc="-1" dirty="0">
+              <a:solidFill>
+                <a:schemeClr val="tx1"/>
+              </a:solidFill>
               <a:latin typeface="Arial" panose="020B0604020202020204" pitchFamily="34" charset="0"/>
               <a:cs typeface="Arial" panose="020B0604020202020204" pitchFamily="34" charset="0"/>
             </a:endParaRPr>
@@ -10604,8 +10724,8 @@
         </p:nvSpPr>
         <p:spPr>
           <a:xfrm rot="16200000">
-            <a:off x="-1643961" y="4680041"/>
-            <a:ext cx="3719716" cy="357793"/>
+            <a:off x="-1096106" y="4132188"/>
+            <a:ext cx="2624010" cy="357793"/>
           </a:xfrm>
           <a:prstGeom prst="rect">
             <a:avLst/>
@@ -10636,7 +10756,11 @@
           <a:p>
             <a:pPr algn="ctr"/>
             <a:r>
-              <a:rPr lang="en-US" dirty="0"/>
+              <a:rPr lang="en-US" dirty="0">
+                <a:solidFill>
+                  <a:schemeClr val="tx1"/>
+                </a:solidFill>
+              </a:rPr>
               <a:t>Message Queue</a:t>
             </a:r>
           </a:p>
@@ -10658,9 +10782,9 @@
           <p:nvPr/>
         </p:nvCxnSpPr>
         <p:spPr>
-          <a:xfrm>
-            <a:off x="444425" y="4443076"/>
-            <a:ext cx="272638" cy="0"/>
+          <a:xfrm flipV="1">
+            <a:off x="444427" y="4322448"/>
+            <a:ext cx="287273" cy="120630"/>
           </a:xfrm>
           <a:prstGeom prst="line">
             <a:avLst/>
@@ -10732,24 +10856,23 @@
       </p:cxnSp>
       <p:cxnSp>
         <p:nvCxnSpPr>
-          <p:cNvPr id="35" name="Straight Connector 34">
-            <a:extLst>
-              <a:ext uri="{FF2B5EF4-FFF2-40B4-BE49-F238E27FC236}">
-                <a16:creationId xmlns:a16="http://schemas.microsoft.com/office/drawing/2014/main" id="{DF0592DB-409A-6900-F6F3-E70AD5990D2B}"/>
+          <p:cNvPr id="38" name="Straight Connector 37">
+            <a:extLst>
+              <a:ext uri="{FF2B5EF4-FFF2-40B4-BE49-F238E27FC236}">
+                <a16:creationId xmlns:a16="http://schemas.microsoft.com/office/drawing/2014/main" id="{47ABC277-B9A2-B7B2-5CB1-2F141144826A}"/>
               </a:ext>
             </a:extLst>
           </p:cNvPr>
           <p:cNvCxnSpPr>
             <a:cxnSpLocks/>
             <a:stCxn id="20" idx="2"/>
-            <a:endCxn id="6" idx="1"/>
           </p:cNvCxnSpPr>
           <p:nvPr/>
         </p:nvCxnSpPr>
         <p:spPr>
           <a:xfrm>
-            <a:off x="938302" y="4443076"/>
-            <a:ext cx="270807" cy="2064421"/>
+            <a:off x="938304" y="4322448"/>
+            <a:ext cx="300636" cy="1712930"/>
           </a:xfrm>
           <a:prstGeom prst="line">
             <a:avLst/>
@@ -10775,50 +10898,6 @@
           </a:fontRef>
         </p:style>
       </p:cxnSp>
-      <p:cxnSp>
-        <p:nvCxnSpPr>
-          <p:cNvPr id="38" name="Straight Connector 37">
-            <a:extLst>
-              <a:ext uri="{FF2B5EF4-FFF2-40B4-BE49-F238E27FC236}">
-                <a16:creationId xmlns:a16="http://schemas.microsoft.com/office/drawing/2014/main" id="{47ABC277-B9A2-B7B2-5CB1-2F141144826A}"/>
-              </a:ext>
-            </a:extLst>
-          </p:cNvPr>
-          <p:cNvCxnSpPr>
-            <a:cxnSpLocks/>
-            <a:stCxn id="20" idx="2"/>
-          </p:cNvCxnSpPr>
-          <p:nvPr/>
-        </p:nvCxnSpPr>
-        <p:spPr>
-          <a:xfrm>
-            <a:off x="938302" y="4443076"/>
-            <a:ext cx="300636" cy="1592300"/>
-          </a:xfrm>
-          <a:prstGeom prst="line">
-            <a:avLst/>
-          </a:prstGeom>
-          <a:ln w="57150">
-            <a:solidFill>
-              <a:srgbClr val="0070C0"/>
-            </a:solidFill>
-          </a:ln>
-        </p:spPr>
-        <p:style>
-          <a:lnRef idx="2">
-            <a:schemeClr val="accent1"/>
-          </a:lnRef>
-          <a:fillRef idx="0">
-            <a:schemeClr val="accent1"/>
-          </a:fillRef>
-          <a:effectRef idx="1">
-            <a:schemeClr val="accent1"/>
-          </a:effectRef>
-          <a:fontRef idx="minor">
-            <a:schemeClr val="tx1"/>
-          </a:fontRef>
-        </p:style>
-      </p:cxnSp>
       <p:sp>
         <p:nvSpPr>
           <p:cNvPr id="41" name="CustomShape 30">
@@ -10872,7 +10951,7 @@
             <a:r>
               <a:rPr lang="en-US" sz="1100" b="1" strike="noStrike" spc="-1" dirty="0">
                 <a:solidFill>
-                  <a:srgbClr val="FFFFFF"/>
+                  <a:schemeClr val="tx1"/>
                 </a:solidFill>
                 <a:latin typeface="Arial" panose="020B0604020202020204" pitchFamily="34" charset="0"/>
                 <a:cs typeface="Arial" panose="020B0604020202020204" pitchFamily="34" charset="0"/>
@@ -10880,6 +10959,9 @@
               <a:t>RESTful API (RF/SF)</a:t>
             </a:r>
             <a:endParaRPr lang="en-IE" sz="1100" b="1" strike="noStrike" spc="-1" dirty="0">
+              <a:solidFill>
+                <a:schemeClr val="tx1"/>
+              </a:solidFill>
               <a:latin typeface="Arial" panose="020B0604020202020204" pitchFamily="34" charset="0"/>
               <a:cs typeface="Arial" panose="020B0604020202020204" pitchFamily="34" charset="0"/>
             </a:endParaRPr>
@@ -10891,6 +10973,9 @@
               </a:lnSpc>
             </a:pPr>
             <a:endParaRPr lang="en-IE" sz="1100" b="1" strike="noStrike" spc="-1" dirty="0">
+              <a:solidFill>
+                <a:schemeClr val="tx1"/>
+              </a:solidFill>
               <a:latin typeface="Arial" panose="020B0604020202020204" pitchFamily="34" charset="0"/>
               <a:cs typeface="Arial" panose="020B0604020202020204" pitchFamily="34" charset="0"/>
             </a:endParaRPr>
@@ -10943,7 +11028,11 @@
           <a:p>
             <a:pPr algn="ctr"/>
             <a:r>
-              <a:rPr lang="en-US" dirty="0"/>
+              <a:rPr lang="en-US" dirty="0">
+                <a:solidFill>
+                  <a:schemeClr val="tx1"/>
+                </a:solidFill>
+              </a:rPr>
               <a:t>Message Queue</a:t>
             </a:r>
           </a:p>
@@ -11090,7 +11179,7 @@
             <a:r>
               <a:rPr lang="en-US" sz="1100" b="1" strike="noStrike" spc="-1" dirty="0">
                 <a:solidFill>
-                  <a:srgbClr val="FFFFFF"/>
+                  <a:schemeClr val="tx1"/>
                 </a:solidFill>
                 <a:latin typeface="Arial" panose="020B0604020202020204" pitchFamily="34" charset="0"/>
                 <a:cs typeface="Arial" panose="020B0604020202020204" pitchFamily="34" charset="0"/>
@@ -11098,6 +11187,9 @@
               <a:t>RESTful API (RF/SF)</a:t>
             </a:r>
             <a:endParaRPr lang="en-IE" sz="1100" b="1" strike="noStrike" spc="-1" dirty="0">
+              <a:solidFill>
+                <a:schemeClr val="tx1"/>
+              </a:solidFill>
               <a:latin typeface="Arial" panose="020B0604020202020204" pitchFamily="34" charset="0"/>
               <a:cs typeface="Arial" panose="020B0604020202020204" pitchFamily="34" charset="0"/>
             </a:endParaRPr>
@@ -11109,6 +11201,9 @@
               </a:lnSpc>
             </a:pPr>
             <a:endParaRPr lang="en-IE" sz="1100" b="1" strike="noStrike" spc="-1" dirty="0">
+              <a:solidFill>
+                <a:schemeClr val="tx1"/>
+              </a:solidFill>
               <a:latin typeface="Arial" panose="020B0604020202020204" pitchFamily="34" charset="0"/>
               <a:cs typeface="Arial" panose="020B0604020202020204" pitchFamily="34" charset="0"/>
             </a:endParaRPr>
@@ -11161,7 +11256,11 @@
           <a:p>
             <a:pPr algn="ctr"/>
             <a:r>
-              <a:rPr lang="en-US" dirty="0"/>
+              <a:rPr lang="en-US" dirty="0">
+                <a:solidFill>
+                  <a:schemeClr val="tx1"/>
+                </a:solidFill>
+              </a:rPr>
               <a:t>Message Queue</a:t>
             </a:r>
           </a:p>
@@ -11360,10 +11459,139 @@
           </a:p>
         </p:txBody>
       </p:sp>
+      <p:sp>
+        <p:nvSpPr>
+          <p:cNvPr id="28" name="CustomShape 30">
+            <a:extLst>
+              <a:ext uri="{FF2B5EF4-FFF2-40B4-BE49-F238E27FC236}">
+                <a16:creationId xmlns:a16="http://schemas.microsoft.com/office/drawing/2014/main" id="{89CEEF0B-2C59-1DBC-974A-DC439D8CCB9E}"/>
+              </a:ext>
+            </a:extLst>
+          </p:cNvPr>
+          <p:cNvSpPr/>
+          <p:nvPr/>
+        </p:nvSpPr>
+        <p:spPr>
+          <a:xfrm rot="16200000">
+            <a:off x="-180247" y="5946973"/>
+            <a:ext cx="1147989" cy="675901"/>
+          </a:xfrm>
+          <a:prstGeom prst="rect">
+            <a:avLst/>
+          </a:prstGeom>
+          <a:solidFill>
+            <a:srgbClr val="FFC000"/>
+          </a:solidFill>
+          <a:ln/>
+        </p:spPr>
+        <p:style>
+          <a:lnRef idx="2">
+            <a:schemeClr val="accent2"/>
+          </a:lnRef>
+          <a:fillRef idx="1">
+            <a:schemeClr val="lt1"/>
+          </a:fillRef>
+          <a:effectRef idx="0">
+            <a:schemeClr val="accent2"/>
+          </a:effectRef>
+          <a:fontRef idx="minor">
+            <a:schemeClr val="dk1"/>
+          </a:fontRef>
+        </p:style>
+        <p:txBody>
+          <a:bodyPr lIns="90000" tIns="45000" rIns="90000" bIns="45000">
+            <a:noAutofit/>
+          </a:bodyPr>
+          <a:lstStyle/>
+          <a:p>
+            <a:pPr algn="ctr"/>
+            <a:r>
+              <a:rPr lang="en-US" sz="1100" dirty="0">
+                <a:solidFill>
+                  <a:schemeClr val="tx1"/>
+                </a:solidFill>
+              </a:rPr>
+              <a:t>Evaluate and Meet Client Requirements</a:t>
+            </a:r>
+          </a:p>
+          <a:p>
+            <a:pPr algn="ctr">
+              <a:lnSpc>
+                <a:spcPct val="100000"/>
+              </a:lnSpc>
+            </a:pPr>
+            <a:endParaRPr lang="en-IE" sz="1100" b="1" strike="noStrike" spc="-1" dirty="0">
+              <a:solidFill>
+                <a:schemeClr val="tx1"/>
+              </a:solidFill>
+              <a:latin typeface="Arial" panose="020B0604020202020204" pitchFamily="34" charset="0"/>
+              <a:cs typeface="Arial" panose="020B0604020202020204" pitchFamily="34" charset="0"/>
+            </a:endParaRPr>
+          </a:p>
+          <a:p>
+            <a:pPr algn="ctr">
+              <a:lnSpc>
+                <a:spcPct val="100000"/>
+              </a:lnSpc>
+            </a:pPr>
+            <a:endParaRPr lang="en-IE" sz="1100" b="1" strike="noStrike" spc="-1" dirty="0">
+              <a:solidFill>
+                <a:schemeClr val="tx1"/>
+              </a:solidFill>
+              <a:latin typeface="Arial" panose="020B0604020202020204" pitchFamily="34" charset="0"/>
+              <a:cs typeface="Arial" panose="020B0604020202020204" pitchFamily="34" charset="0"/>
+            </a:endParaRPr>
+          </a:p>
+        </p:txBody>
+      </p:sp>
+      <p:cxnSp>
+        <p:nvCxnSpPr>
+          <p:cNvPr id="29" name="Straight Connector 28">
+            <a:extLst>
+              <a:ext uri="{FF2B5EF4-FFF2-40B4-BE49-F238E27FC236}">
+                <a16:creationId xmlns:a16="http://schemas.microsoft.com/office/drawing/2014/main" id="{AE28C8FD-9DF9-3267-EE75-532DE5E07306}"/>
+              </a:ext>
+            </a:extLst>
+          </p:cNvPr>
+          <p:cNvCxnSpPr>
+            <a:cxnSpLocks/>
+            <a:stCxn id="28" idx="2"/>
+          </p:cNvCxnSpPr>
+          <p:nvPr/>
+        </p:nvCxnSpPr>
+        <p:spPr>
+          <a:xfrm>
+            <a:off x="731698" y="6284923"/>
+            <a:ext cx="490343" cy="289449"/>
+          </a:xfrm>
+          <a:prstGeom prst="line">
+            <a:avLst/>
+          </a:prstGeom>
+          <a:ln w="57150">
+            <a:solidFill>
+              <a:srgbClr val="00B050"/>
+            </a:solidFill>
+          </a:ln>
+        </p:spPr>
+        <p:style>
+          <a:lnRef idx="2">
+            <a:schemeClr val="accent1"/>
+          </a:lnRef>
+          <a:fillRef idx="0">
+            <a:schemeClr val="accent1"/>
+          </a:fillRef>
+          <a:effectRef idx="1">
+            <a:schemeClr val="accent1"/>
+          </a:effectRef>
+          <a:fontRef idx="minor">
+            <a:schemeClr val="tx1"/>
+          </a:fontRef>
+        </p:style>
+      </p:cxnSp>
     </p:spTree>
     <p:extLst>
       <p:ext uri="{BB962C8B-B14F-4D97-AF65-F5344CB8AC3E}">
-        <p14:creationId xmlns:p14="http://schemas.microsoft.com/office/powerpoint/2010/main" val="3262570192"/>
+        <p14:creationId xmlns:p14="http://schemas.microsoft.com/office/powerpoint/2010/main" val="3478085397"/>
       </p:ext>
     </p:extLst>
   </p:cSld>
@@ -11477,7 +11705,7 @@
                                           </p:stCondLst>
                                         </p:cTn>
                                         <p:tgtEl>
-                                          <p:spTgt spid="35"/>
+                                          <p:spTgt spid="38"/>
                                         </p:tgtEl>
                                         <p:attrNameLst>
                                           <p:attrName>style.visibility</p:attrName>
@@ -11491,7 +11719,7 @@
                                       <p:cBhvr>
                                         <p:cTn id="13" dur="500"/>
                                         <p:tgtEl>
-                                          <p:spTgt spid="35"/>
+                                          <p:spTgt spid="38"/>
                                         </p:tgtEl>
                                       </p:cBhvr>
                                     </p:animEffect>
@@ -11512,7 +11740,7 @@
                                           </p:stCondLst>
                                         </p:cTn>
                                         <p:tgtEl>
-                                          <p:spTgt spid="38"/>
+                                          <p:spTgt spid="43"/>
                                         </p:tgtEl>
                                         <p:attrNameLst>
                                           <p:attrName>style.visibility</p:attrName>
@@ -11526,7 +11754,7 @@
                                       <p:cBhvr>
                                         <p:cTn id="16" dur="500"/>
                                         <p:tgtEl>
-                                          <p:spTgt spid="38"/>
+                                          <p:spTgt spid="43"/>
                                         </p:tgtEl>
                                       </p:cBhvr>
                                     </p:animEffect>
@@ -11547,7 +11775,7 @@
                                           </p:stCondLst>
                                         </p:cTn>
                                         <p:tgtEl>
-                                          <p:spTgt spid="43"/>
+                                          <p:spTgt spid="51"/>
                                         </p:tgtEl>
                                         <p:attrNameLst>
                                           <p:attrName>style.visibility</p:attrName>
@@ -11561,7 +11789,7 @@
                                       <p:cBhvr>
                                         <p:cTn id="19" dur="500"/>
                                         <p:tgtEl>
-                                          <p:spTgt spid="43"/>
+                                          <p:spTgt spid="51"/>
                                         </p:tgtEl>
                                       </p:cBhvr>
                                     </p:animEffect>
@@ -11582,7 +11810,7 @@
                                           </p:stCondLst>
                                         </p:cTn>
                                         <p:tgtEl>
-                                          <p:spTgt spid="51"/>
+                                          <p:spTgt spid="76"/>
                                         </p:tgtEl>
                                         <p:attrNameLst>
                                           <p:attrName>style.visibility</p:attrName>
@@ -11596,7 +11824,7 @@
                                       <p:cBhvr>
                                         <p:cTn id="22" dur="500"/>
                                         <p:tgtEl>
-                                          <p:spTgt spid="51"/>
+                                          <p:spTgt spid="76"/>
                                         </p:tgtEl>
                                       </p:cBhvr>
                                     </p:animEffect>
@@ -11617,7 +11845,7 @@
                                           </p:stCondLst>
                                         </p:cTn>
                                         <p:tgtEl>
-                                          <p:spTgt spid="76"/>
+                                          <p:spTgt spid="85"/>
                                         </p:tgtEl>
                                         <p:attrNameLst>
                                           <p:attrName>style.visibility</p:attrName>
@@ -11631,7 +11859,7 @@
                                       <p:cBhvr>
                                         <p:cTn id="25" dur="500"/>
                                         <p:tgtEl>
-                                          <p:spTgt spid="76"/>
+                                          <p:spTgt spid="85"/>
                                         </p:tgtEl>
                                       </p:cBhvr>
                                     </p:animEffect>
@@ -11652,7 +11880,7 @@
                                           </p:stCondLst>
                                         </p:cTn>
                                         <p:tgtEl>
-                                          <p:spTgt spid="85"/>
+                                          <p:spTgt spid="29"/>
                                         </p:tgtEl>
                                         <p:attrNameLst>
                                           <p:attrName>style.visibility</p:attrName>
@@ -11666,7 +11894,7 @@
                                       <p:cBhvr>
                                         <p:cTn id="28" dur="500"/>
                                         <p:tgtEl>
-                                          <p:spTgt spid="85"/>
+                                          <p:spTgt spid="29"/>
                                         </p:tgtEl>
                                       </p:cBhvr>
                                     </p:animEffect>

</xml_diff>